<commit_message>
Added templates and rethemed shell presentations
</commit_message>
<xml_diff>
--- a/shell/presentations/0_editors.pptx
+++ b/shell/presentations/0_editors.pptx
@@ -2,7 +2,7 @@
 <file path=ppt/presentation.xml><?xml version="1.0" encoding="utf-8"?>
 <p:presentation xmlns:a="http://schemas.openxmlformats.org/drawingml/2006/main" xmlns:r="http://schemas.openxmlformats.org/officeDocument/2006/relationships" xmlns:p="http://schemas.openxmlformats.org/presentationml/2006/main" saveSubsetFonts="1" autoCompressPictures="0">
   <p:sldMasterIdLst>
-    <p:sldMasterId id="2147483675" r:id="rId1"/>
+    <p:sldMasterId id="2147483683" r:id="rId1"/>
   </p:sldMasterIdLst>
   <p:sldIdLst>
     <p:sldId id="256" r:id="rId2"/>
@@ -293,7 +293,7 @@
           <a:p>
             <a:fld id="{D119BB77-888A-BF43-BE39-D421BFDFAD7D}" type="datetimeFigureOut">
               <a:rPr lang="en-US" smtClean="0"/>
-              <a:t>9/25/2018</a:t>
+              <a:t>9/26/2018</a:t>
             </a:fld>
             <a:endParaRPr lang="en-US"/>
           </a:p>
@@ -408,7 +408,7 @@
     </p:spTree>
     <p:extLst>
       <p:ext uri="{BB962C8B-B14F-4D97-AF65-F5344CB8AC3E}">
-        <p14:creationId xmlns:p14="http://schemas.microsoft.com/office/powerpoint/2010/main" val="4082839255"/>
+        <p14:creationId xmlns:p14="http://schemas.microsoft.com/office/powerpoint/2010/main" val="144663251"/>
       </p:ext>
     </p:extLst>
   </p:cSld>
@@ -582,7 +582,7 @@
             <a:fld id="{646265C4-D3EB-4033-9F2F-7AE1FCA20C43}" type="datetimeFigureOut">
               <a:rPr lang="en-GB" smtClean="0"/>
               <a:pPr/>
-              <a:t>25/09/2018</a:t>
+              <a:t>26/09/2018</a:t>
             </a:fld>
             <a:endParaRPr lang="en-GB" dirty="0"/>
           </a:p>
@@ -635,7 +635,7 @@
     </p:spTree>
     <p:extLst>
       <p:ext uri="{BB962C8B-B14F-4D97-AF65-F5344CB8AC3E}">
-        <p14:creationId xmlns:p14="http://schemas.microsoft.com/office/powerpoint/2010/main" val="619601923"/>
+        <p14:creationId xmlns:p14="http://schemas.microsoft.com/office/powerpoint/2010/main" val="2844718727"/>
       </p:ext>
     </p:extLst>
   </p:cSld>
@@ -809,7 +809,7 @@
             <a:fld id="{646265C4-D3EB-4033-9F2F-7AE1FCA20C43}" type="datetimeFigureOut">
               <a:rPr lang="en-GB" smtClean="0"/>
               <a:pPr/>
-              <a:t>25/09/2018</a:t>
+              <a:t>26/09/2018</a:t>
             </a:fld>
             <a:endParaRPr lang="en-GB" dirty="0"/>
           </a:p>
@@ -862,7 +862,7 @@
     </p:spTree>
     <p:extLst>
       <p:ext uri="{BB962C8B-B14F-4D97-AF65-F5344CB8AC3E}">
-        <p14:creationId xmlns:p14="http://schemas.microsoft.com/office/powerpoint/2010/main" val="4072198106"/>
+        <p14:creationId xmlns:p14="http://schemas.microsoft.com/office/powerpoint/2010/main" val="1800367110"/>
       </p:ext>
     </p:extLst>
   </p:cSld>
@@ -2515,7 +2515,7 @@
     </p:spTree>
     <p:extLst>
       <p:ext uri="{BB962C8B-B14F-4D97-AF65-F5344CB8AC3E}">
-        <p14:creationId xmlns:p14="http://schemas.microsoft.com/office/powerpoint/2010/main" val="1925975842"/>
+        <p14:creationId xmlns:p14="http://schemas.microsoft.com/office/powerpoint/2010/main" val="1782891737"/>
       </p:ext>
     </p:extLst>
   </p:cSld>
@@ -4124,7 +4124,7 @@
     </p:spTree>
     <p:extLst>
       <p:ext uri="{BB962C8B-B14F-4D97-AF65-F5344CB8AC3E}">
-        <p14:creationId xmlns:p14="http://schemas.microsoft.com/office/powerpoint/2010/main" val="3952543075"/>
+        <p14:creationId xmlns:p14="http://schemas.microsoft.com/office/powerpoint/2010/main" val="1953159063"/>
       </p:ext>
     </p:extLst>
   </p:cSld>
@@ -4279,7 +4279,7 @@
     </p:spTree>
     <p:extLst>
       <p:ext uri="{BB962C8B-B14F-4D97-AF65-F5344CB8AC3E}">
-        <p14:creationId xmlns:p14="http://schemas.microsoft.com/office/powerpoint/2010/main" val="1183699941"/>
+        <p14:creationId xmlns:p14="http://schemas.microsoft.com/office/powerpoint/2010/main" val="3720229550"/>
       </p:ext>
     </p:extLst>
   </p:cSld>
@@ -4441,7 +4441,7 @@
     </p:spTree>
     <p:extLst>
       <p:ext uri="{BB962C8B-B14F-4D97-AF65-F5344CB8AC3E}">
-        <p14:creationId xmlns:p14="http://schemas.microsoft.com/office/powerpoint/2010/main" val="744779880"/>
+        <p14:creationId xmlns:p14="http://schemas.microsoft.com/office/powerpoint/2010/main" val="2336835711"/>
       </p:ext>
     </p:extLst>
   </p:cSld>
@@ -4608,8 +4608,8 @@
         </p:nvSpPr>
         <p:spPr>
           <a:xfrm>
-            <a:off x="723420" y="1356702"/>
-            <a:ext cx="7886700" cy="4351338"/>
+            <a:off x="376516" y="1374631"/>
+            <a:ext cx="8417860" cy="4351338"/>
           </a:xfrm>
           <a:prstGeom prst="rect">
             <a:avLst/>
@@ -4701,8 +4701,8 @@
         </p:nvSpPr>
         <p:spPr>
           <a:xfrm>
-            <a:off x="723420" y="380325"/>
-            <a:ext cx="7886700" cy="880969"/>
+            <a:off x="376518" y="380325"/>
+            <a:ext cx="8417858" cy="880969"/>
           </a:xfrm>
           <a:prstGeom prst="rect">
             <a:avLst/>
@@ -4725,23 +4725,23 @@
     </p:spTree>
     <p:extLst>
       <p:ext uri="{BB962C8B-B14F-4D97-AF65-F5344CB8AC3E}">
-        <p14:creationId xmlns:p14="http://schemas.microsoft.com/office/powerpoint/2010/main" val="1043256884"/>
+        <p14:creationId xmlns:p14="http://schemas.microsoft.com/office/powerpoint/2010/main" val="3210534554"/>
       </p:ext>
     </p:extLst>
   </p:cSld>
   <p:clrMap bg1="lt1" tx1="dk1" bg2="lt2" tx2="dk2" accent1="accent1" accent2="accent2" accent3="accent3" accent4="accent4" accent5="accent5" accent6="accent6" hlink="hlink" folHlink="folHlink"/>
   <p:sldLayoutIdLst>
-    <p:sldLayoutId id="2147483676" r:id="rId1"/>
-    <p:sldLayoutId id="2147483677" r:id="rId2"/>
-    <p:sldLayoutId id="2147483678" r:id="rId3"/>
-    <p:sldLayoutId id="2147483679" r:id="rId4"/>
-    <p:sldLayoutId id="2147483680" r:id="rId5"/>
-    <p:sldLayoutId id="2147483681" r:id="rId6"/>
-    <p:sldLayoutId id="2147483682" r:id="rId7"/>
+    <p:sldLayoutId id="2147483684" r:id="rId1"/>
+    <p:sldLayoutId id="2147483685" r:id="rId2"/>
+    <p:sldLayoutId id="2147483686" r:id="rId3"/>
+    <p:sldLayoutId id="2147483687" r:id="rId4"/>
+    <p:sldLayoutId id="2147483688" r:id="rId5"/>
+    <p:sldLayoutId id="2147483689" r:id="rId6"/>
+    <p:sldLayoutId id="2147483690" r:id="rId7"/>
   </p:sldLayoutIdLst>
   <p:txStyles>
     <p:titleStyle>
-      <a:lvl1pPr algn="l" defTabSz="914400" rtl="0" eaLnBrk="1" latinLnBrk="0" hangingPunct="1">
+      <a:lvl1pPr algn="ctr" defTabSz="914400" rtl="0" eaLnBrk="1" latinLnBrk="0" hangingPunct="1">
         <a:lnSpc>
           <a:spcPct val="90000"/>
         </a:lnSpc>
@@ -5113,6 +5113,29 @@
       </p:grpSpPr>
       <p:sp>
         <p:nvSpPr>
+          <p:cNvPr id="5" name="Title 4"/>
+          <p:cNvSpPr>
+            <a:spLocks noGrp="1"/>
+          </p:cNvSpPr>
+          <p:nvPr>
+            <p:ph type="title"/>
+          </p:nvPr>
+        </p:nvSpPr>
+        <p:spPr/>
+        <p:txBody>
+          <a:bodyPr/>
+          <a:lstStyle/>
+          <a:p>
+            <a:r>
+              <a:rPr lang="en-US" dirty="0"/>
+              <a:t>What is an Editor</a:t>
+            </a:r>
+            <a:endParaRPr lang="en-GB" dirty="0"/>
+          </a:p>
+        </p:txBody>
+      </p:sp>
+      <p:sp>
+        <p:nvSpPr>
           <p:cNvPr id="3" name="Content Placeholder 2"/>
           <p:cNvSpPr>
             <a:spLocks noGrp="1"/>
@@ -5161,29 +5184,6 @@
               <a:t>emacs</a:t>
             </a:r>
             <a:endParaRPr lang="en-US" dirty="0"/>
-          </a:p>
-        </p:txBody>
-      </p:sp>
-      <p:sp>
-        <p:nvSpPr>
-          <p:cNvPr id="5" name="Title 4"/>
-          <p:cNvSpPr>
-            <a:spLocks noGrp="1"/>
-          </p:cNvSpPr>
-          <p:nvPr>
-            <p:ph type="title"/>
-          </p:nvPr>
-        </p:nvSpPr>
-        <p:spPr/>
-        <p:txBody>
-          <a:bodyPr/>
-          <a:lstStyle/>
-          <a:p>
-            <a:r>
-              <a:rPr lang="en-US" dirty="0"/>
-              <a:t>What is an Editor</a:t>
-            </a:r>
-            <a:endParaRPr lang="en-GB" dirty="0"/>
           </a:p>
         </p:txBody>
       </p:sp>
@@ -5217,6 +5217,33 @@
           <a:chExt cx="0" cy="0"/>
         </a:xfrm>
       </p:grpSpPr>
+      <p:sp>
+        <p:nvSpPr>
+          <p:cNvPr id="7" name="Title 6"/>
+          <p:cNvSpPr>
+            <a:spLocks noGrp="1"/>
+          </p:cNvSpPr>
+          <p:nvPr>
+            <p:ph type="title"/>
+          </p:nvPr>
+        </p:nvSpPr>
+        <p:spPr/>
+        <p:txBody>
+          <a:bodyPr/>
+          <a:lstStyle/>
+          <a:p>
+            <a:r>
+              <a:rPr lang="en-US" dirty="0"/>
+              <a:t>Today we will be using </a:t>
+            </a:r>
+            <a:r>
+              <a:rPr lang="en-US" dirty="0" err="1"/>
+              <a:t>gedit</a:t>
+            </a:r>
+            <a:endParaRPr lang="en-GB" dirty="0"/>
+          </a:p>
+        </p:txBody>
+      </p:sp>
       <p:pic>
         <p:nvPicPr>
           <p:cNvPr id="4" name="Content Placeholder 3"/>
@@ -5238,33 +5265,6 @@
           </a:xfrm>
         </p:spPr>
       </p:pic>
-      <p:sp>
-        <p:nvSpPr>
-          <p:cNvPr id="7" name="Title 6"/>
-          <p:cNvSpPr>
-            <a:spLocks noGrp="1"/>
-          </p:cNvSpPr>
-          <p:nvPr>
-            <p:ph type="title"/>
-          </p:nvPr>
-        </p:nvSpPr>
-        <p:spPr/>
-        <p:txBody>
-          <a:bodyPr/>
-          <a:lstStyle/>
-          <a:p>
-            <a:r>
-              <a:rPr lang="en-US" dirty="0"/>
-              <a:t>Today we will be using </a:t>
-            </a:r>
-            <a:r>
-              <a:rPr lang="en-US" dirty="0" err="1"/>
-              <a:t>gedit</a:t>
-            </a:r>
-            <a:endParaRPr lang="en-GB" dirty="0"/>
-          </a:p>
-        </p:txBody>
-      </p:sp>
     </p:spTree>
     <p:extLst>
       <p:ext uri="{BB962C8B-B14F-4D97-AF65-F5344CB8AC3E}">
@@ -11176,7 +11176,7 @@
   <a:extraClrSchemeLst/>
   <a:extLst>
     <a:ext uri="{05A4C25C-085E-4340-85A3-A5531E510DB2}">
-      <thm15:themeFamily xmlns:thm15="http://schemas.microsoft.com/office/thememl/2012/main" name="UKRI-stfc-nerc-ceda-ncas-nceo-Presentation-Template.pptx" id="{0FBDF782-A45F-4DBA-A38A-5309CF8154AD}" vid="{DBF383B2-4014-42C8-9F90-AC8E3679BB05}"/>
+      <thm15:themeFamily xmlns:thm15="http://schemas.microsoft.com/office/thememl/2012/main" name="UKRI-stfc-nerc-ceda-ncas-nceo-Presentation-Template.pptx" id="{16196DC8-0494-474D-9935-E7D06E7DAD21}" vid="{73A0A59C-1B13-40E9-B94A-99F65E47A944}"/>
     </a:ext>
   </a:extLst>
 </a:theme>

</xml_diff>